<commit_message>
mostly working html page. Not perfect. No dynamic lettering
</commit_message>
<xml_diff>
--- a/SCRATCHPAD.pptx
+++ b/SCRATCHPAD.pptx
@@ -3535,8 +3535,8 @@
         </p:nvSpPr>
         <p:spPr>
           <a:xfrm>
-            <a:off x="0" y="515094"/>
-            <a:ext cx="2752725" cy="338554"/>
+            <a:off x="95250" y="584776"/>
+            <a:ext cx="2752725" cy="4031873"/>
           </a:xfrm>
           <a:prstGeom prst="rect">
             <a:avLst/>
@@ -3551,7 +3551,85 @@
           <a:p>
             <a:r>
               <a:rPr lang="en-CA" sz="1600" dirty="0"/>
-              <a:t>What it should look like</a:t>
+              <a:t>Screen should look like this. </a:t>
+            </a:r>
+          </a:p>
+          <a:p>
+            <a:endParaRPr lang="en-CA" sz="1600" dirty="0"/>
+          </a:p>
+          <a:p>
+            <a:r>
+              <a:rPr lang="en-CA" sz="1600" b="1" u="sng" dirty="0"/>
+              <a:t>Behaviour: </a:t>
+            </a:r>
+          </a:p>
+          <a:p>
+            <a:pPr marL="285750" indent="-285750">
+              <a:buFont typeface="Arial" panose="020B0604020202020204" pitchFamily="34" charset="0"/>
+              <a:buChar char="•"/>
+            </a:pPr>
+            <a:r>
+              <a:rPr lang="en-CA" sz="1600" dirty="0"/>
+              <a:t>On during local daylight time (where the pi is located)</a:t>
+            </a:r>
+          </a:p>
+          <a:p>
+            <a:pPr marL="285750" indent="-285750">
+              <a:buFont typeface="Arial" panose="020B0604020202020204" pitchFamily="34" charset="0"/>
+              <a:buChar char="•"/>
+            </a:pPr>
+            <a:endParaRPr lang="en-CA" sz="1600" dirty="0"/>
+          </a:p>
+          <a:p>
+            <a:pPr marL="285750" indent="-285750">
+              <a:buFont typeface="Arial" panose="020B0604020202020204" pitchFamily="34" charset="0"/>
+              <a:buChar char="•"/>
+            </a:pPr>
+            <a:r>
+              <a:rPr lang="en-CA" sz="1600" dirty="0"/>
+              <a:t>Off weekdays during work hours. </a:t>
+            </a:r>
+          </a:p>
+          <a:p>
+            <a:pPr marL="285750" indent="-285750">
+              <a:buFont typeface="Arial" panose="020B0604020202020204" pitchFamily="34" charset="0"/>
+              <a:buChar char="•"/>
+            </a:pPr>
+            <a:endParaRPr lang="en-CA" sz="1600" dirty="0"/>
+          </a:p>
+          <a:p>
+            <a:pPr marL="285750" indent="-285750">
+              <a:buFont typeface="Arial" panose="020B0604020202020204" pitchFamily="34" charset="0"/>
+              <a:buChar char="•"/>
+            </a:pPr>
+            <a:r>
+              <a:rPr lang="en-CA" sz="1600" dirty="0"/>
+              <a:t>Change to next webcam every 30 seconds. </a:t>
+            </a:r>
+          </a:p>
+          <a:p>
+            <a:pPr marL="285750" indent="-285750">
+              <a:buFont typeface="Arial" panose="020B0604020202020204" pitchFamily="34" charset="0"/>
+              <a:buChar char="•"/>
+            </a:pPr>
+            <a:endParaRPr lang="en-CA" sz="1600" dirty="0"/>
+          </a:p>
+          <a:p>
+            <a:pPr marL="285750" indent="-285750">
+              <a:buFont typeface="Arial" panose="020B0604020202020204" pitchFamily="34" charset="0"/>
+              <a:buChar char="•"/>
+            </a:pPr>
+            <a:r>
+              <a:rPr lang="en-CA" sz="1600" dirty="0"/>
+              <a:t>Use physical </a:t>
+            </a:r>
+            <a:r>
+              <a:rPr lang="en-CA" sz="1600" dirty="0" err="1"/>
+              <a:t>gpio</a:t>
+            </a:r>
+            <a:r>
+              <a:rPr lang="en-CA" sz="1600" dirty="0"/>
+              <a:t> button to switch between screens in a loop.</a:t>
             </a:r>
           </a:p>
         </p:txBody>

</xml_diff>

<commit_message>
update behaviour target wording
</commit_message>
<xml_diff>
--- a/SCRATCHPAD.pptx
+++ b/SCRATCHPAD.pptx
@@ -104,6 +104,11 @@
       </a:defRPr>
     </a:lvl9pPr>
   </p:defaultTextStyle>
+  <p:extLst>
+    <p:ext uri="{EFAFB233-063F-42B5-8137-9DF3F51BA10A}">
+      <p15:sldGuideLst xmlns:p15="http://schemas.microsoft.com/office/powerpoint/2012/main"/>
+    </p:ext>
+  </p:extLst>
 </p:presentation>
 </file>
 
@@ -256,7 +261,7 @@
           <a:p>
             <a:fld id="{2610FE25-A520-4920-81B5-96B0085F604B}" type="datetimeFigureOut">
               <a:rPr lang="en-CA" smtClean="0"/>
-              <a:t>2025-09-01</a:t>
+              <a:t>2025-11-02</a:t>
             </a:fld>
             <a:endParaRPr lang="en-CA"/>
           </a:p>
@@ -456,7 +461,7 @@
           <a:p>
             <a:fld id="{2610FE25-A520-4920-81B5-96B0085F604B}" type="datetimeFigureOut">
               <a:rPr lang="en-CA" smtClean="0"/>
-              <a:t>2025-09-01</a:t>
+              <a:t>2025-11-02</a:t>
             </a:fld>
             <a:endParaRPr lang="en-CA"/>
           </a:p>
@@ -666,7 +671,7 @@
           <a:p>
             <a:fld id="{2610FE25-A520-4920-81B5-96B0085F604B}" type="datetimeFigureOut">
               <a:rPr lang="en-CA" smtClean="0"/>
-              <a:t>2025-09-01</a:t>
+              <a:t>2025-11-02</a:t>
             </a:fld>
             <a:endParaRPr lang="en-CA"/>
           </a:p>
@@ -866,7 +871,7 @@
           <a:p>
             <a:fld id="{2610FE25-A520-4920-81B5-96B0085F604B}" type="datetimeFigureOut">
               <a:rPr lang="en-CA" smtClean="0"/>
-              <a:t>2025-09-01</a:t>
+              <a:t>2025-11-02</a:t>
             </a:fld>
             <a:endParaRPr lang="en-CA"/>
           </a:p>
@@ -1142,7 +1147,7 @@
           <a:p>
             <a:fld id="{2610FE25-A520-4920-81B5-96B0085F604B}" type="datetimeFigureOut">
               <a:rPr lang="en-CA" smtClean="0"/>
-              <a:t>2025-09-01</a:t>
+              <a:t>2025-11-02</a:t>
             </a:fld>
             <a:endParaRPr lang="en-CA"/>
           </a:p>
@@ -1410,7 +1415,7 @@
           <a:p>
             <a:fld id="{2610FE25-A520-4920-81B5-96B0085F604B}" type="datetimeFigureOut">
               <a:rPr lang="en-CA" smtClean="0"/>
-              <a:t>2025-09-01</a:t>
+              <a:t>2025-11-02</a:t>
             </a:fld>
             <a:endParaRPr lang="en-CA"/>
           </a:p>
@@ -1825,7 +1830,7 @@
           <a:p>
             <a:fld id="{2610FE25-A520-4920-81B5-96B0085F604B}" type="datetimeFigureOut">
               <a:rPr lang="en-CA" smtClean="0"/>
-              <a:t>2025-09-01</a:t>
+              <a:t>2025-11-02</a:t>
             </a:fld>
             <a:endParaRPr lang="en-CA"/>
           </a:p>
@@ -1967,7 +1972,7 @@
           <a:p>
             <a:fld id="{2610FE25-A520-4920-81B5-96B0085F604B}" type="datetimeFigureOut">
               <a:rPr lang="en-CA" smtClean="0"/>
-              <a:t>2025-09-01</a:t>
+              <a:t>2025-11-02</a:t>
             </a:fld>
             <a:endParaRPr lang="en-CA"/>
           </a:p>
@@ -2080,7 +2085,7 @@
           <a:p>
             <a:fld id="{2610FE25-A520-4920-81B5-96B0085F604B}" type="datetimeFigureOut">
               <a:rPr lang="en-CA" smtClean="0"/>
-              <a:t>2025-09-01</a:t>
+              <a:t>2025-11-02</a:t>
             </a:fld>
             <a:endParaRPr lang="en-CA"/>
           </a:p>
@@ -2393,7 +2398,7 @@
           <a:p>
             <a:fld id="{2610FE25-A520-4920-81B5-96B0085F604B}" type="datetimeFigureOut">
               <a:rPr lang="en-CA" smtClean="0"/>
-              <a:t>2025-09-01</a:t>
+              <a:t>2025-11-02</a:t>
             </a:fld>
             <a:endParaRPr lang="en-CA"/>
           </a:p>
@@ -2682,7 +2687,7 @@
           <a:p>
             <a:fld id="{2610FE25-A520-4920-81B5-96B0085F604B}" type="datetimeFigureOut">
               <a:rPr lang="en-CA" smtClean="0"/>
-              <a:t>2025-09-01</a:t>
+              <a:t>2025-11-02</a:t>
             </a:fld>
             <a:endParaRPr lang="en-CA"/>
           </a:p>
@@ -2925,7 +2930,7 @@
           <a:p>
             <a:fld id="{2610FE25-A520-4920-81B5-96B0085F604B}" type="datetimeFigureOut">
               <a:rPr lang="en-CA" smtClean="0"/>
-              <a:t>2025-09-01</a:t>
+              <a:t>2025-11-02</a:t>
             </a:fld>
             <a:endParaRPr lang="en-CA"/>
           </a:p>
@@ -3536,7 +3541,7 @@
         <p:spPr>
           <a:xfrm>
             <a:off x="95250" y="584776"/>
-            <a:ext cx="2752725" cy="4031873"/>
+            <a:ext cx="2752725" cy="2308324"/>
           </a:xfrm>
           <a:prstGeom prst="rect">
             <a:avLst/>
@@ -3587,49 +3592,7 @@
             </a:pPr>
             <a:r>
               <a:rPr lang="en-CA" sz="1600" dirty="0"/>
-              <a:t>Off weekdays during work hours. </a:t>
-            </a:r>
-          </a:p>
-          <a:p>
-            <a:pPr marL="285750" indent="-285750">
-              <a:buFont typeface="Arial" panose="020B0604020202020204" pitchFamily="34" charset="0"/>
-              <a:buChar char="•"/>
-            </a:pPr>
-            <a:endParaRPr lang="en-CA" sz="1600" dirty="0"/>
-          </a:p>
-          <a:p>
-            <a:pPr marL="285750" indent="-285750">
-              <a:buFont typeface="Arial" panose="020B0604020202020204" pitchFamily="34" charset="0"/>
-              <a:buChar char="•"/>
-            </a:pPr>
-            <a:r>
-              <a:rPr lang="en-CA" sz="1600" dirty="0"/>
-              <a:t>Change to next webcam every 30 seconds. </a:t>
-            </a:r>
-          </a:p>
-          <a:p>
-            <a:pPr marL="285750" indent="-285750">
-              <a:buFont typeface="Arial" panose="020B0604020202020204" pitchFamily="34" charset="0"/>
-              <a:buChar char="•"/>
-            </a:pPr>
-            <a:endParaRPr lang="en-CA" sz="1600" dirty="0"/>
-          </a:p>
-          <a:p>
-            <a:pPr marL="285750" indent="-285750">
-              <a:buFont typeface="Arial" panose="020B0604020202020204" pitchFamily="34" charset="0"/>
-              <a:buChar char="•"/>
-            </a:pPr>
-            <a:r>
-              <a:rPr lang="en-CA" sz="1600" dirty="0"/>
-              <a:t>Use physical </a:t>
-            </a:r>
-            <a:r>
-              <a:rPr lang="en-CA" sz="1600" dirty="0" err="1"/>
-              <a:t>gpio</a:t>
-            </a:r>
-            <a:r>
-              <a:rPr lang="en-CA" sz="1600" dirty="0"/>
-              <a:t> button to switch between screens in a loop.</a:t>
+              <a:t>Change to next webcam every 60 seconds. </a:t>
             </a:r>
           </a:p>
         </p:txBody>

</xml_diff>